<commit_message>
test: one output file per test
</commit_message>
<xml_diff>
--- a/__tests__/pptx-templates/SlideWithLink.pptx
+++ b/__tests__/pptx-templates/SlideWithLink.pptx
@@ -259,7 +259,7 @@
           <a:p>
             <a:fld id="{8FB60A0F-5ED1-45ED-A5D5-DB038E6B70D9}" type="datetimeFigureOut">
               <a:rPr lang="de-DE" smtClean="0"/>
-              <a:t>11.03.2021</a:t>
+              <a:t>17.03.2021</a:t>
             </a:fld>
             <a:endParaRPr lang="de-DE"/>
           </a:p>
@@ -457,7 +457,7 @@
           <a:p>
             <a:fld id="{8FB60A0F-5ED1-45ED-A5D5-DB038E6B70D9}" type="datetimeFigureOut">
               <a:rPr lang="de-DE" smtClean="0"/>
-              <a:t>11.03.2021</a:t>
+              <a:t>17.03.2021</a:t>
             </a:fld>
             <a:endParaRPr lang="de-DE"/>
           </a:p>
@@ -665,7 +665,7 @@
           <a:p>
             <a:fld id="{8FB60A0F-5ED1-45ED-A5D5-DB038E6B70D9}" type="datetimeFigureOut">
               <a:rPr lang="de-DE" smtClean="0"/>
-              <a:t>11.03.2021</a:t>
+              <a:t>17.03.2021</a:t>
             </a:fld>
             <a:endParaRPr lang="de-DE"/>
           </a:p>
@@ -863,7 +863,7 @@
           <a:p>
             <a:fld id="{8FB60A0F-5ED1-45ED-A5D5-DB038E6B70D9}" type="datetimeFigureOut">
               <a:rPr lang="de-DE" smtClean="0"/>
-              <a:t>11.03.2021</a:t>
+              <a:t>17.03.2021</a:t>
             </a:fld>
             <a:endParaRPr lang="de-DE"/>
           </a:p>
@@ -1138,7 +1138,7 @@
           <a:p>
             <a:fld id="{8FB60A0F-5ED1-45ED-A5D5-DB038E6B70D9}" type="datetimeFigureOut">
               <a:rPr lang="de-DE" smtClean="0"/>
-              <a:t>11.03.2021</a:t>
+              <a:t>17.03.2021</a:t>
             </a:fld>
             <a:endParaRPr lang="de-DE"/>
           </a:p>
@@ -1403,7 +1403,7 @@
           <a:p>
             <a:fld id="{8FB60A0F-5ED1-45ED-A5D5-DB038E6B70D9}" type="datetimeFigureOut">
               <a:rPr lang="de-DE" smtClean="0"/>
-              <a:t>11.03.2021</a:t>
+              <a:t>17.03.2021</a:t>
             </a:fld>
             <a:endParaRPr lang="de-DE"/>
           </a:p>
@@ -1815,7 +1815,7 @@
           <a:p>
             <a:fld id="{8FB60A0F-5ED1-45ED-A5D5-DB038E6B70D9}" type="datetimeFigureOut">
               <a:rPr lang="de-DE" smtClean="0"/>
-              <a:t>11.03.2021</a:t>
+              <a:t>17.03.2021</a:t>
             </a:fld>
             <a:endParaRPr lang="de-DE"/>
           </a:p>
@@ -1956,7 +1956,7 @@
           <a:p>
             <a:fld id="{8FB60A0F-5ED1-45ED-A5D5-DB038E6B70D9}" type="datetimeFigureOut">
               <a:rPr lang="de-DE" smtClean="0"/>
-              <a:t>11.03.2021</a:t>
+              <a:t>17.03.2021</a:t>
             </a:fld>
             <a:endParaRPr lang="de-DE"/>
           </a:p>
@@ -2069,7 +2069,7 @@
           <a:p>
             <a:fld id="{8FB60A0F-5ED1-45ED-A5D5-DB038E6B70D9}" type="datetimeFigureOut">
               <a:rPr lang="de-DE" smtClean="0"/>
-              <a:t>11.03.2021</a:t>
+              <a:t>17.03.2021</a:t>
             </a:fld>
             <a:endParaRPr lang="de-DE"/>
           </a:p>
@@ -2380,7 +2380,7 @@
           <a:p>
             <a:fld id="{8FB60A0F-5ED1-45ED-A5D5-DB038E6B70D9}" type="datetimeFigureOut">
               <a:rPr lang="de-DE" smtClean="0"/>
-              <a:t>11.03.2021</a:t>
+              <a:t>17.03.2021</a:t>
             </a:fld>
             <a:endParaRPr lang="de-DE"/>
           </a:p>
@@ -2668,7 +2668,7 @@
           <a:p>
             <a:fld id="{8FB60A0F-5ED1-45ED-A5D5-DB038E6B70D9}" type="datetimeFigureOut">
               <a:rPr lang="de-DE" smtClean="0"/>
-              <a:t>11.03.2021</a:t>
+              <a:t>17.03.2021</a:t>
             </a:fld>
             <a:endParaRPr lang="de-DE"/>
           </a:p>
@@ -2909,7 +2909,7 @@
           <a:p>
             <a:fld id="{8FB60A0F-5ED1-45ED-A5D5-DB038E6B70D9}" type="datetimeFigureOut">
               <a:rPr lang="de-DE" smtClean="0"/>
-              <a:t>11.03.2021</a:t>
+              <a:t>17.03.2021</a:t>
             </a:fld>
             <a:endParaRPr lang="de-DE"/>
           </a:p>
@@ -3328,7 +3328,7 @@
       </p:grpSpPr>
       <p:sp>
         <p:nvSpPr>
-          <p:cNvPr id="2" name="Textfeld 1">
+          <p:cNvPr id="2" name="Link">
             <a:extLst>
               <a:ext uri="{FF2B5EF4-FFF2-40B4-BE49-F238E27FC236}">
                 <a16:creationId xmlns:a16="http://schemas.microsoft.com/office/drawing/2014/main" id="{8FA352D2-3D71-44AF-ABF4-7B8631A6B015}"/>

</xml_diff>

<commit_message>
feat(link): support for external and internal link (WIP)
</commit_message>
<xml_diff>
--- a/__tests__/pptx-templates/SlideWithLink.pptx
+++ b/__tests__/pptx-templates/SlideWithLink.pptx
@@ -6,6 +6,7 @@
   </p:sldMasterIdLst>
   <p:sldIdLst>
     <p:sldId id="256" r:id="rId2"/>
+    <p:sldId id="257" r:id="rId3"/>
   </p:sldIdLst>
   <p:sldSz cx="12192000" cy="6858000"/>
   <p:notesSz cx="6858000" cy="9144000"/>
@@ -259,7 +260,7 @@
           <a:p>
             <a:fld id="{8FB60A0F-5ED1-45ED-A5D5-DB038E6B70D9}" type="datetimeFigureOut">
               <a:rPr lang="de-DE" smtClean="0"/>
-              <a:t>17.03.2021</a:t>
+              <a:t>24.02.2025</a:t>
             </a:fld>
             <a:endParaRPr lang="de-DE"/>
           </a:p>
@@ -457,7 +458,7 @@
           <a:p>
             <a:fld id="{8FB60A0F-5ED1-45ED-A5D5-DB038E6B70D9}" type="datetimeFigureOut">
               <a:rPr lang="de-DE" smtClean="0"/>
-              <a:t>17.03.2021</a:t>
+              <a:t>24.02.2025</a:t>
             </a:fld>
             <a:endParaRPr lang="de-DE"/>
           </a:p>
@@ -665,7 +666,7 @@
           <a:p>
             <a:fld id="{8FB60A0F-5ED1-45ED-A5D5-DB038E6B70D9}" type="datetimeFigureOut">
               <a:rPr lang="de-DE" smtClean="0"/>
-              <a:t>17.03.2021</a:t>
+              <a:t>24.02.2025</a:t>
             </a:fld>
             <a:endParaRPr lang="de-DE"/>
           </a:p>
@@ -863,7 +864,7 @@
           <a:p>
             <a:fld id="{8FB60A0F-5ED1-45ED-A5D5-DB038E6B70D9}" type="datetimeFigureOut">
               <a:rPr lang="de-DE" smtClean="0"/>
-              <a:t>17.03.2021</a:t>
+              <a:t>24.02.2025</a:t>
             </a:fld>
             <a:endParaRPr lang="de-DE"/>
           </a:p>
@@ -1138,7 +1139,7 @@
           <a:p>
             <a:fld id="{8FB60A0F-5ED1-45ED-A5D5-DB038E6B70D9}" type="datetimeFigureOut">
               <a:rPr lang="de-DE" smtClean="0"/>
-              <a:t>17.03.2021</a:t>
+              <a:t>24.02.2025</a:t>
             </a:fld>
             <a:endParaRPr lang="de-DE"/>
           </a:p>
@@ -1403,7 +1404,7 @@
           <a:p>
             <a:fld id="{8FB60A0F-5ED1-45ED-A5D5-DB038E6B70D9}" type="datetimeFigureOut">
               <a:rPr lang="de-DE" smtClean="0"/>
-              <a:t>17.03.2021</a:t>
+              <a:t>24.02.2025</a:t>
             </a:fld>
             <a:endParaRPr lang="de-DE"/>
           </a:p>
@@ -1815,7 +1816,7 @@
           <a:p>
             <a:fld id="{8FB60A0F-5ED1-45ED-A5D5-DB038E6B70D9}" type="datetimeFigureOut">
               <a:rPr lang="de-DE" smtClean="0"/>
-              <a:t>17.03.2021</a:t>
+              <a:t>24.02.2025</a:t>
             </a:fld>
             <a:endParaRPr lang="de-DE"/>
           </a:p>
@@ -1956,7 +1957,7 @@
           <a:p>
             <a:fld id="{8FB60A0F-5ED1-45ED-A5D5-DB038E6B70D9}" type="datetimeFigureOut">
               <a:rPr lang="de-DE" smtClean="0"/>
-              <a:t>17.03.2021</a:t>
+              <a:t>24.02.2025</a:t>
             </a:fld>
             <a:endParaRPr lang="de-DE"/>
           </a:p>
@@ -2069,7 +2070,7 @@
           <a:p>
             <a:fld id="{8FB60A0F-5ED1-45ED-A5D5-DB038E6B70D9}" type="datetimeFigureOut">
               <a:rPr lang="de-DE" smtClean="0"/>
-              <a:t>17.03.2021</a:t>
+              <a:t>24.02.2025</a:t>
             </a:fld>
             <a:endParaRPr lang="de-DE"/>
           </a:p>
@@ -2380,7 +2381,7 @@
           <a:p>
             <a:fld id="{8FB60A0F-5ED1-45ED-A5D5-DB038E6B70D9}" type="datetimeFigureOut">
               <a:rPr lang="de-DE" smtClean="0"/>
-              <a:t>17.03.2021</a:t>
+              <a:t>24.02.2025</a:t>
             </a:fld>
             <a:endParaRPr lang="de-DE"/>
           </a:p>
@@ -2668,7 +2669,7 @@
           <a:p>
             <a:fld id="{8FB60A0F-5ED1-45ED-A5D5-DB038E6B70D9}" type="datetimeFigureOut">
               <a:rPr lang="de-DE" smtClean="0"/>
-              <a:t>17.03.2021</a:t>
+              <a:t>24.02.2025</a:t>
             </a:fld>
             <a:endParaRPr lang="de-DE"/>
           </a:p>
@@ -2909,7 +2910,7 @@
           <a:p>
             <a:fld id="{8FB60A0F-5ED1-45ED-A5D5-DB038E6B70D9}" type="datetimeFigureOut">
               <a:rPr lang="de-DE" smtClean="0"/>
-              <a:t>17.03.2021</a:t>
+              <a:t>24.02.2025</a:t>
             </a:fld>
             <a:endParaRPr lang="de-DE"/>
           </a:p>
@@ -3328,7 +3329,7 @@
       </p:grpSpPr>
       <p:sp>
         <p:nvSpPr>
-          <p:cNvPr id="2" name="Link">
+          <p:cNvPr id="2" name="ExternalLink">
             <a:extLst>
               <a:ext uri="{FF2B5EF4-FFF2-40B4-BE49-F238E27FC236}">
                 <a16:creationId xmlns:a16="http://schemas.microsoft.com/office/drawing/2014/main" id="{8FA352D2-3D71-44AF-ABF4-7B8631A6B015}"/>
@@ -3341,7 +3342,7 @@
         <p:spPr>
           <a:xfrm>
             <a:off x="4876800" y="2641600"/>
-            <a:ext cx="1868460" cy="369332"/>
+            <a:ext cx="2688749" cy="369332"/>
           </a:xfrm>
           <a:prstGeom prst="rect">
             <a:avLst/>
@@ -3355,12 +3356,74 @@
           <a:lstStyle/>
           <a:p>
             <a:r>
-              <a:rPr lang="de-DE">
+              <a:rPr lang="de-DE" dirty="0">
                 <a:hlinkClick r:id="rId2"/>
               </a:rPr>
-              <a:t>Link to Repository</a:t>
-            </a:r>
-            <a:endParaRPr lang="de-DE"/>
+              <a:t>Link </a:t>
+            </a:r>
+            <a:r>
+              <a:rPr lang="de-DE" dirty="0" err="1">
+                <a:hlinkClick r:id="rId2"/>
+              </a:rPr>
+              <a:t>to</a:t>
+            </a:r>
+            <a:r>
+              <a:rPr lang="de-DE" dirty="0">
+                <a:hlinkClick r:id="rId2"/>
+              </a:rPr>
+              <a:t> external Repository</a:t>
+            </a:r>
+            <a:endParaRPr lang="de-DE" dirty="0"/>
+          </a:p>
+        </p:txBody>
+      </p:sp>
+      <p:sp>
+        <p:nvSpPr>
+          <p:cNvPr id="3" name="LinkToSlide">
+            <a:hlinkClick r:id="rId3" action="ppaction://hlinksldjump"/>
+            <a:extLst>
+              <a:ext uri="{FF2B5EF4-FFF2-40B4-BE49-F238E27FC236}">
+                <a16:creationId xmlns:a16="http://schemas.microsoft.com/office/drawing/2014/main" id="{C9FC9B83-0FEB-46F7-BF1A-88440A256ABC}"/>
+              </a:ext>
+            </a:extLst>
+          </p:cNvPr>
+          <p:cNvSpPr/>
+          <p:nvPr/>
+        </p:nvSpPr>
+        <p:spPr>
+          <a:xfrm>
+            <a:off x="9244208" y="5135671"/>
+            <a:ext cx="1741118" cy="651354"/>
+          </a:xfrm>
+          <a:prstGeom prst="rect">
+            <a:avLst/>
+          </a:prstGeom>
+        </p:spPr>
+        <p:style>
+          <a:lnRef idx="2">
+            <a:schemeClr val="accent1">
+              <a:shade val="50000"/>
+            </a:schemeClr>
+          </a:lnRef>
+          <a:fillRef idx="1">
+            <a:schemeClr val="accent1"/>
+          </a:fillRef>
+          <a:effectRef idx="0">
+            <a:schemeClr val="accent1"/>
+          </a:effectRef>
+          <a:fontRef idx="minor">
+            <a:schemeClr val="lt1"/>
+          </a:fontRef>
+        </p:style>
+        <p:txBody>
+          <a:bodyPr rtlCol="0" anchor="ctr"/>
+          <a:lstStyle/>
+          <a:p>
+            <a:pPr algn="ctr"/>
+            <a:r>
+              <a:rPr lang="en-US" dirty="0"/>
+              <a:t>Link to Slide #2</a:t>
+            </a:r>
           </a:p>
         </p:txBody>
       </p:sp>
@@ -3368,6 +3431,71 @@
     <p:extLst>
       <p:ext uri="{BB962C8B-B14F-4D97-AF65-F5344CB8AC3E}">
         <p14:creationId xmlns:p14="http://schemas.microsoft.com/office/powerpoint/2010/main" val="4167997312"/>
+      </p:ext>
+    </p:extLst>
+  </p:cSld>
+  <p:clrMapOvr>
+    <a:masterClrMapping/>
+  </p:clrMapOvr>
+</p:sld>
+</file>
+
+<file path=ppt/slides/slide2.xml><?xml version="1.0" encoding="utf-8"?>
+<p:sld xmlns:a="http://schemas.openxmlformats.org/drawingml/2006/main" xmlns:r="http://schemas.openxmlformats.org/officeDocument/2006/relationships" xmlns:p="http://schemas.openxmlformats.org/presentationml/2006/main">
+  <p:cSld>
+    <p:spTree>
+      <p:nvGrpSpPr>
+        <p:cNvPr id="1" name=""/>
+        <p:cNvGrpSpPr/>
+        <p:nvPr/>
+      </p:nvGrpSpPr>
+      <p:grpSpPr>
+        <a:xfrm>
+          <a:off x="0" y="0"/>
+          <a:ext cx="0" cy="0"/>
+          <a:chOff x="0" y="0"/>
+          <a:chExt cx="0" cy="0"/>
+        </a:xfrm>
+      </p:grpSpPr>
+      <p:sp>
+        <p:nvSpPr>
+          <p:cNvPr id="3" name="Textfeld 2">
+            <a:extLst>
+              <a:ext uri="{FF2B5EF4-FFF2-40B4-BE49-F238E27FC236}">
+                <a16:creationId xmlns:a16="http://schemas.microsoft.com/office/drawing/2014/main" id="{509A10B3-E30A-4FD3-BFB8-9DD5EA0BF56C}"/>
+              </a:ext>
+            </a:extLst>
+          </p:cNvPr>
+          <p:cNvSpPr txBox="1"/>
+          <p:nvPr/>
+        </p:nvSpPr>
+        <p:spPr>
+          <a:xfrm>
+            <a:off x="2530258" y="2367419"/>
+            <a:ext cx="3720230" cy="369332"/>
+          </a:xfrm>
+          <a:prstGeom prst="rect">
+            <a:avLst/>
+          </a:prstGeom>
+          <a:noFill/>
+        </p:spPr>
+        <p:txBody>
+          <a:bodyPr wrap="square" rtlCol="0">
+            <a:spAutoFit/>
+          </a:bodyPr>
+          <a:lstStyle/>
+          <a:p>
+            <a:r>
+              <a:rPr lang="en-US" dirty="0"/>
+              <a:t>Slide #2</a:t>
+            </a:r>
+          </a:p>
+        </p:txBody>
+      </p:sp>
+    </p:spTree>
+    <p:extLst>
+      <p:ext uri="{BB962C8B-B14F-4D97-AF65-F5344CB8AC3E}">
+        <p14:creationId xmlns:p14="http://schemas.microsoft.com/office/powerpoint/2010/main" val="3765852995"/>
       </p:ext>
     </p:extLst>
   </p:cSld>

</xml_diff>

<commit_message>
chore(test): use hyperlinks in tables; see #171
</commit_message>
<xml_diff>
--- a/__tests__/pptx-templates/SlideWithLink.pptx
+++ b/__tests__/pptx-templates/SlideWithLink.pptx
@@ -260,7 +260,7 @@
           <a:p>
             <a:fld id="{8FB60A0F-5ED1-45ED-A5D5-DB038E6B70D9}" type="datetimeFigureOut">
               <a:rPr lang="de-DE" smtClean="0"/>
-              <a:t>24.02.2025</a:t>
+              <a:t>24.06.2025</a:t>
             </a:fld>
             <a:endParaRPr lang="de-DE"/>
           </a:p>
@@ -458,7 +458,7 @@
           <a:p>
             <a:fld id="{8FB60A0F-5ED1-45ED-A5D5-DB038E6B70D9}" type="datetimeFigureOut">
               <a:rPr lang="de-DE" smtClean="0"/>
-              <a:t>24.02.2025</a:t>
+              <a:t>24.06.2025</a:t>
             </a:fld>
             <a:endParaRPr lang="de-DE"/>
           </a:p>
@@ -666,7 +666,7 @@
           <a:p>
             <a:fld id="{8FB60A0F-5ED1-45ED-A5D5-DB038E6B70D9}" type="datetimeFigureOut">
               <a:rPr lang="de-DE" smtClean="0"/>
-              <a:t>24.02.2025</a:t>
+              <a:t>24.06.2025</a:t>
             </a:fld>
             <a:endParaRPr lang="de-DE"/>
           </a:p>
@@ -864,7 +864,7 @@
           <a:p>
             <a:fld id="{8FB60A0F-5ED1-45ED-A5D5-DB038E6B70D9}" type="datetimeFigureOut">
               <a:rPr lang="de-DE" smtClean="0"/>
-              <a:t>24.02.2025</a:t>
+              <a:t>24.06.2025</a:t>
             </a:fld>
             <a:endParaRPr lang="de-DE"/>
           </a:p>
@@ -1139,7 +1139,7 @@
           <a:p>
             <a:fld id="{8FB60A0F-5ED1-45ED-A5D5-DB038E6B70D9}" type="datetimeFigureOut">
               <a:rPr lang="de-DE" smtClean="0"/>
-              <a:t>24.02.2025</a:t>
+              <a:t>24.06.2025</a:t>
             </a:fld>
             <a:endParaRPr lang="de-DE"/>
           </a:p>
@@ -1404,7 +1404,7 @@
           <a:p>
             <a:fld id="{8FB60A0F-5ED1-45ED-A5D5-DB038E6B70D9}" type="datetimeFigureOut">
               <a:rPr lang="de-DE" smtClean="0"/>
-              <a:t>24.02.2025</a:t>
+              <a:t>24.06.2025</a:t>
             </a:fld>
             <a:endParaRPr lang="de-DE"/>
           </a:p>
@@ -1816,7 +1816,7 @@
           <a:p>
             <a:fld id="{8FB60A0F-5ED1-45ED-A5D5-DB038E6B70D9}" type="datetimeFigureOut">
               <a:rPr lang="de-DE" smtClean="0"/>
-              <a:t>24.02.2025</a:t>
+              <a:t>24.06.2025</a:t>
             </a:fld>
             <a:endParaRPr lang="de-DE"/>
           </a:p>
@@ -1957,7 +1957,7 @@
           <a:p>
             <a:fld id="{8FB60A0F-5ED1-45ED-A5D5-DB038E6B70D9}" type="datetimeFigureOut">
               <a:rPr lang="de-DE" smtClean="0"/>
-              <a:t>24.02.2025</a:t>
+              <a:t>24.06.2025</a:t>
             </a:fld>
             <a:endParaRPr lang="de-DE"/>
           </a:p>
@@ -2070,7 +2070,7 @@
           <a:p>
             <a:fld id="{8FB60A0F-5ED1-45ED-A5D5-DB038E6B70D9}" type="datetimeFigureOut">
               <a:rPr lang="de-DE" smtClean="0"/>
-              <a:t>24.02.2025</a:t>
+              <a:t>24.06.2025</a:t>
             </a:fld>
             <a:endParaRPr lang="de-DE"/>
           </a:p>
@@ -2381,7 +2381,7 @@
           <a:p>
             <a:fld id="{8FB60A0F-5ED1-45ED-A5D5-DB038E6B70D9}" type="datetimeFigureOut">
               <a:rPr lang="de-DE" smtClean="0"/>
-              <a:t>24.02.2025</a:t>
+              <a:t>24.06.2025</a:t>
             </a:fld>
             <a:endParaRPr lang="de-DE"/>
           </a:p>
@@ -2669,7 +2669,7 @@
           <a:p>
             <a:fld id="{8FB60A0F-5ED1-45ED-A5D5-DB038E6B70D9}" type="datetimeFigureOut">
               <a:rPr lang="de-DE" smtClean="0"/>
-              <a:t>24.02.2025</a:t>
+              <a:t>24.06.2025</a:t>
             </a:fld>
             <a:endParaRPr lang="de-DE"/>
           </a:p>
@@ -2910,7 +2910,7 @@
           <a:p>
             <a:fld id="{8FB60A0F-5ED1-45ED-A5D5-DB038E6B70D9}" type="datetimeFigureOut">
               <a:rPr lang="de-DE" smtClean="0"/>
-              <a:t>24.02.2025</a:t>
+              <a:t>24.06.2025</a:t>
             </a:fld>
             <a:endParaRPr lang="de-DE"/>
           </a:p>
@@ -3427,6 +3427,464 @@
           </a:p>
         </p:txBody>
       </p:sp>
+      <p:graphicFrame>
+        <p:nvGraphicFramePr>
+          <p:cNvPr id="4" name="TableWithLink">
+            <a:extLst>
+              <a:ext uri="{FF2B5EF4-FFF2-40B4-BE49-F238E27FC236}">
+                <a16:creationId xmlns:a16="http://schemas.microsoft.com/office/drawing/2014/main" id="{54918B3A-A881-4BD8-AB28-AE8711B3C5C0}"/>
+              </a:ext>
+            </a:extLst>
+          </p:cNvPr>
+          <p:cNvGraphicFramePr>
+            <a:graphicFrameLocks noGrp="1"/>
+          </p:cNvGraphicFramePr>
+          <p:nvPr>
+            <p:extLst>
+              <p:ext uri="{D42A27DB-BD31-4B8C-83A1-F6EECF244321}">
+                <p14:modId xmlns:p14="http://schemas.microsoft.com/office/powerpoint/2010/main" val="586950784"/>
+              </p:ext>
+            </p:extLst>
+          </p:nvPr>
+        </p:nvGraphicFramePr>
+        <p:xfrm>
+          <a:off x="862419" y="4279881"/>
+          <a:ext cx="5533548" cy="1280949"/>
+        </p:xfrm>
+        <a:graphic>
+          <a:graphicData uri="http://schemas.openxmlformats.org/drawingml/2006/table">
+            <a:tbl>
+              <a:tblPr bandRow="1">
+                <a:tableStyleId>{5C22544A-7EE6-4342-B048-85BDC9FD1C3A}</a:tableStyleId>
+              </a:tblPr>
+              <a:tblGrid>
+                <a:gridCol w="1383387">
+                  <a:extLst>
+                    <a:ext uri="{9D8B030D-6E8A-4147-A177-3AD203B41FA5}">
+                      <a16:colId xmlns:a16="http://schemas.microsoft.com/office/drawing/2014/main" val="2081046437"/>
+                    </a:ext>
+                  </a:extLst>
+                </a:gridCol>
+                <a:gridCol w="1383387">
+                  <a:extLst>
+                    <a:ext uri="{9D8B030D-6E8A-4147-A177-3AD203B41FA5}">
+                      <a16:colId xmlns:a16="http://schemas.microsoft.com/office/drawing/2014/main" val="3700495073"/>
+                    </a:ext>
+                  </a:extLst>
+                </a:gridCol>
+                <a:gridCol w="1383387">
+                  <a:extLst>
+                    <a:ext uri="{9D8B030D-6E8A-4147-A177-3AD203B41FA5}">
+                      <a16:colId xmlns:a16="http://schemas.microsoft.com/office/drawing/2014/main" val="4155264383"/>
+                    </a:ext>
+                  </a:extLst>
+                </a:gridCol>
+                <a:gridCol w="1383387">
+                  <a:extLst>
+                    <a:ext uri="{9D8B030D-6E8A-4147-A177-3AD203B41FA5}">
+                      <a16:colId xmlns:a16="http://schemas.microsoft.com/office/drawing/2014/main" val="113879652"/>
+                    </a:ext>
+                  </a:extLst>
+                </a:gridCol>
+              </a:tblGrid>
+              <a:tr h="426983">
+                <a:tc>
+                  <a:txBody>
+                    <a:bodyPr/>
+                    <a:lstStyle/>
+                    <a:p>
+                      <a:pPr algn="ctr"/>
+                      <a:r>
+                        <a:rPr kumimoji="0" lang="de-DE" sz="1400" b="0" i="0" u="none" strike="noStrike" kern="1200" cap="none" spc="0" normalizeH="0" baseline="0" noProof="0">
+                          <a:ln>
+                            <a:noFill/>
+                          </a:ln>
+                          <a:solidFill>
+                            <a:prstClr val="black"/>
+                          </a:solidFill>
+                          <a:effectLst/>
+                          <a:uLnTx/>
+                          <a:uFillTx/>
+                          <a:latin typeface="Calibri" panose="020F0502020204030204"/>
+                          <a:ea typeface="+mn-ea"/>
+                          <a:cs typeface="+mn-cs"/>
+                        </a:rPr>
+                        <a:t>cell</a:t>
+                      </a:r>
+                      <a:endParaRPr lang="de-DE" sz="1400"/>
+                    </a:p>
+                  </a:txBody>
+                  <a:tcPr/>
+                </a:tc>
+                <a:tc>
+                  <a:txBody>
+                    <a:bodyPr/>
+                    <a:lstStyle/>
+                    <a:p>
+                      <a:pPr algn="ctr"/>
+                      <a:r>
+                        <a:rPr kumimoji="0" lang="de-DE" sz="1400" b="0" i="0" u="none" strike="noStrike" kern="1200" cap="none" spc="0" normalizeH="0" baseline="0" noProof="0">
+                          <a:ln>
+                            <a:noFill/>
+                          </a:ln>
+                          <a:solidFill>
+                            <a:prstClr val="black"/>
+                          </a:solidFill>
+                          <a:effectLst/>
+                          <a:uLnTx/>
+                          <a:uFillTx/>
+                          <a:latin typeface="Calibri" panose="020F0502020204030204"/>
+                          <a:ea typeface="+mn-ea"/>
+                          <a:cs typeface="+mn-cs"/>
+                        </a:rPr>
+                        <a:t>cell</a:t>
+                      </a:r>
+                      <a:endParaRPr lang="de-DE" sz="1400"/>
+                    </a:p>
+                  </a:txBody>
+                  <a:tcPr/>
+                </a:tc>
+                <a:tc>
+                  <a:txBody>
+                    <a:bodyPr/>
+                    <a:lstStyle/>
+                    <a:p>
+                      <a:pPr algn="ctr"/>
+                      <a:r>
+                        <a:rPr kumimoji="0" lang="de-DE" sz="1400" b="0" i="0" u="none" strike="noStrike" kern="1200" cap="none" spc="0" normalizeH="0" baseline="0" noProof="0">
+                          <a:ln>
+                            <a:noFill/>
+                          </a:ln>
+                          <a:solidFill>
+                            <a:prstClr val="black"/>
+                          </a:solidFill>
+                          <a:effectLst/>
+                          <a:uLnTx/>
+                          <a:uFillTx/>
+                          <a:latin typeface="Calibri" panose="020F0502020204030204"/>
+                          <a:ea typeface="+mn-ea"/>
+                          <a:cs typeface="+mn-cs"/>
+                        </a:rPr>
+                        <a:t>cell</a:t>
+                      </a:r>
+                      <a:endParaRPr lang="de-DE" sz="1400"/>
+                    </a:p>
+                  </a:txBody>
+                  <a:tcPr/>
+                </a:tc>
+                <a:tc>
+                  <a:txBody>
+                    <a:bodyPr/>
+                    <a:lstStyle/>
+                    <a:p>
+                      <a:pPr algn="ctr"/>
+                      <a:r>
+                        <a:rPr kumimoji="0" lang="de-DE" sz="1400" b="0" i="0" u="none" strike="noStrike" kern="1200" cap="none" spc="0" normalizeH="0" baseline="0" noProof="0" dirty="0" err="1">
+                          <a:ln>
+                            <a:noFill/>
+                          </a:ln>
+                          <a:solidFill>
+                            <a:prstClr val="black"/>
+                          </a:solidFill>
+                          <a:effectLst/>
+                          <a:uLnTx/>
+                          <a:uFillTx/>
+                          <a:latin typeface="Calibri" panose="020F0502020204030204"/>
+                          <a:ea typeface="+mn-ea"/>
+                          <a:cs typeface="+mn-cs"/>
+                        </a:rPr>
+                        <a:t>cell</a:t>
+                      </a:r>
+                      <a:endParaRPr lang="de-DE" sz="1400" dirty="0"/>
+                    </a:p>
+                  </a:txBody>
+                  <a:tcPr/>
+                </a:tc>
+                <a:extLst>
+                  <a:ext uri="{0D108BD9-81ED-4DB2-BD59-A6C34878D82A}">
+                    <a16:rowId xmlns:a16="http://schemas.microsoft.com/office/drawing/2014/main" val="1523742880"/>
+                  </a:ext>
+                </a:extLst>
+              </a:tr>
+              <a:tr h="426983">
+                <a:tc>
+                  <a:txBody>
+                    <a:bodyPr/>
+                    <a:lstStyle/>
+                    <a:p>
+                      <a:pPr algn="ctr"/>
+                      <a:r>
+                        <a:rPr kumimoji="0" lang="de-DE" sz="1400" b="0" i="0" u="none" strike="noStrike" kern="1200" cap="none" spc="0" normalizeH="0" baseline="0" noProof="0">
+                          <a:ln>
+                            <a:noFill/>
+                          </a:ln>
+                          <a:solidFill>
+                            <a:prstClr val="black"/>
+                          </a:solidFill>
+                          <a:effectLst/>
+                          <a:uLnTx/>
+                          <a:uFillTx/>
+                          <a:latin typeface="Calibri" panose="020F0502020204030204"/>
+                          <a:ea typeface="+mn-ea"/>
+                          <a:cs typeface="+mn-cs"/>
+                        </a:rPr>
+                        <a:t>cell</a:t>
+                      </a:r>
+                      <a:endParaRPr lang="de-DE" sz="1400"/>
+                    </a:p>
+                  </a:txBody>
+                  <a:tcPr/>
+                </a:tc>
+                <a:tc>
+                  <a:txBody>
+                    <a:bodyPr/>
+                    <a:lstStyle/>
+                    <a:p>
+                      <a:pPr algn="ctr"/>
+                      <a:r>
+                        <a:rPr kumimoji="0" lang="de-DE" sz="1400" b="0" i="0" u="none" strike="noStrike" kern="1200" cap="none" spc="0" normalizeH="0" baseline="0" noProof="0">
+                          <a:ln>
+                            <a:noFill/>
+                          </a:ln>
+                          <a:solidFill>
+                            <a:prstClr val="black"/>
+                          </a:solidFill>
+                          <a:effectLst/>
+                          <a:uLnTx/>
+                          <a:uFillTx/>
+                          <a:latin typeface="Calibri" panose="020F0502020204030204"/>
+                          <a:ea typeface="+mn-ea"/>
+                          <a:cs typeface="+mn-cs"/>
+                        </a:rPr>
+                        <a:t>cell</a:t>
+                      </a:r>
+                      <a:endParaRPr lang="de-DE" sz="1400"/>
+                    </a:p>
+                  </a:txBody>
+                  <a:tcPr/>
+                </a:tc>
+                <a:tc>
+                  <a:txBody>
+                    <a:bodyPr/>
+                    <a:lstStyle/>
+                    <a:p>
+                      <a:pPr algn="ctr"/>
+                      <a:r>
+                        <a:rPr kumimoji="0" lang="de-DE" sz="1400" b="0" i="0" u="none" strike="noStrike" kern="1200" cap="none" spc="0" normalizeH="0" baseline="0" noProof="0" dirty="0">
+                          <a:ln>
+                            <a:noFill/>
+                          </a:ln>
+                          <a:solidFill>
+                            <a:prstClr val="black"/>
+                          </a:solidFill>
+                          <a:effectLst/>
+                          <a:uLnTx/>
+                          <a:uFillTx/>
+                          <a:latin typeface="Calibri" panose="020F0502020204030204"/>
+                          <a:ea typeface="+mn-ea"/>
+                          <a:cs typeface="+mn-cs"/>
+                          <a:hlinkClick r:id="rId3" action="ppaction://hlinksldjump"/>
+                        </a:rPr>
+                        <a:t>Jump </a:t>
+                      </a:r>
+                      <a:r>
+                        <a:rPr kumimoji="0" lang="de-DE" sz="1400" b="0" i="0" u="none" strike="noStrike" kern="1200" cap="none" spc="0" normalizeH="0" baseline="0" noProof="0" dirty="0" err="1">
+                          <a:ln>
+                            <a:noFill/>
+                          </a:ln>
+                          <a:solidFill>
+                            <a:prstClr val="black"/>
+                          </a:solidFill>
+                          <a:effectLst/>
+                          <a:uLnTx/>
+                          <a:uFillTx/>
+                          <a:latin typeface="Calibri" panose="020F0502020204030204"/>
+                          <a:ea typeface="+mn-ea"/>
+                          <a:cs typeface="+mn-cs"/>
+                          <a:hlinkClick r:id="rId3" action="ppaction://hlinksldjump"/>
+                        </a:rPr>
+                        <a:t>to</a:t>
+                      </a:r>
+                      <a:r>
+                        <a:rPr kumimoji="0" lang="de-DE" sz="1400" b="0" i="0" u="none" strike="noStrike" kern="1200" cap="none" spc="0" normalizeH="0" baseline="0" noProof="0" dirty="0">
+                          <a:ln>
+                            <a:noFill/>
+                          </a:ln>
+                          <a:solidFill>
+                            <a:prstClr val="black"/>
+                          </a:solidFill>
+                          <a:effectLst/>
+                          <a:uLnTx/>
+                          <a:uFillTx/>
+                          <a:latin typeface="Calibri" panose="020F0502020204030204"/>
+                          <a:ea typeface="+mn-ea"/>
+                          <a:cs typeface="+mn-cs"/>
+                          <a:hlinkClick r:id="rId3" action="ppaction://hlinksldjump"/>
+                        </a:rPr>
+                        <a:t> #2</a:t>
+                      </a:r>
+                      <a:endParaRPr lang="de-DE" sz="1400" dirty="0"/>
+                    </a:p>
+                  </a:txBody>
+                  <a:tcPr/>
+                </a:tc>
+                <a:tc>
+                  <a:txBody>
+                    <a:bodyPr/>
+                    <a:lstStyle/>
+                    <a:p>
+                      <a:pPr algn="ctr"/>
+                      <a:r>
+                        <a:rPr kumimoji="0" lang="de-DE" sz="1400" b="0" i="0" u="none" strike="noStrike" kern="1200" cap="none" spc="0" normalizeH="0" baseline="0" noProof="0">
+                          <a:ln>
+                            <a:noFill/>
+                          </a:ln>
+                          <a:solidFill>
+                            <a:prstClr val="black"/>
+                          </a:solidFill>
+                          <a:effectLst/>
+                          <a:uLnTx/>
+                          <a:uFillTx/>
+                          <a:latin typeface="Calibri" panose="020F0502020204030204"/>
+                          <a:ea typeface="+mn-ea"/>
+                          <a:cs typeface="+mn-cs"/>
+                        </a:rPr>
+                        <a:t>cell</a:t>
+                      </a:r>
+                      <a:endParaRPr lang="de-DE" sz="1400"/>
+                    </a:p>
+                  </a:txBody>
+                  <a:tcPr/>
+                </a:tc>
+                <a:extLst>
+                  <a:ext uri="{0D108BD9-81ED-4DB2-BD59-A6C34878D82A}">
+                    <a16:rowId xmlns:a16="http://schemas.microsoft.com/office/drawing/2014/main" val="3580438174"/>
+                  </a:ext>
+                </a:extLst>
+              </a:tr>
+              <a:tr h="426983">
+                <a:tc>
+                  <a:txBody>
+                    <a:bodyPr/>
+                    <a:lstStyle/>
+                    <a:p>
+                      <a:pPr algn="ctr"/>
+                      <a:r>
+                        <a:rPr kumimoji="0" lang="de-DE" sz="1400" b="0" i="0" u="none" strike="noStrike" kern="1200" cap="none" spc="0" normalizeH="0" baseline="0" noProof="0">
+                          <a:ln>
+                            <a:noFill/>
+                          </a:ln>
+                          <a:solidFill>
+                            <a:prstClr val="black"/>
+                          </a:solidFill>
+                          <a:effectLst/>
+                          <a:uLnTx/>
+                          <a:uFillTx/>
+                          <a:latin typeface="Calibri" panose="020F0502020204030204"/>
+                          <a:ea typeface="+mn-ea"/>
+                          <a:cs typeface="+mn-cs"/>
+                        </a:rPr>
+                        <a:t>cell</a:t>
+                      </a:r>
+                      <a:endParaRPr lang="de-DE" sz="1400"/>
+                    </a:p>
+                  </a:txBody>
+                  <a:tcPr/>
+                </a:tc>
+                <a:tc>
+                  <a:txBody>
+                    <a:bodyPr/>
+                    <a:lstStyle/>
+                    <a:p>
+                      <a:pPr algn="ctr"/>
+                      <a:r>
+                        <a:rPr kumimoji="0" lang="de-DE" sz="1400" b="0" i="0" u="none" strike="noStrike" kern="1200" cap="none" spc="0" normalizeH="0" baseline="0" noProof="0" dirty="0" err="1">
+                          <a:ln>
+                            <a:noFill/>
+                          </a:ln>
+                          <a:solidFill>
+                            <a:prstClr val="black"/>
+                          </a:solidFill>
+                          <a:effectLst/>
+                          <a:uLnTx/>
+                          <a:uFillTx/>
+                          <a:latin typeface="Calibri" panose="020F0502020204030204"/>
+                          <a:ea typeface="+mn-ea"/>
+                          <a:cs typeface="+mn-cs"/>
+                        </a:rPr>
+                        <a:t>cell</a:t>
+                      </a:r>
+                      <a:endParaRPr lang="de-DE" sz="1400" dirty="0"/>
+                    </a:p>
+                  </a:txBody>
+                  <a:tcPr/>
+                </a:tc>
+                <a:tc>
+                  <a:txBody>
+                    <a:bodyPr/>
+                    <a:lstStyle/>
+                    <a:p>
+                      <a:pPr algn="ctr"/>
+                      <a:r>
+                        <a:rPr kumimoji="0" lang="de-DE" sz="1400" b="0" i="0" u="none" strike="noStrike" kern="1200" cap="none" spc="0" normalizeH="0" baseline="0" noProof="0">
+                          <a:ln>
+                            <a:noFill/>
+                          </a:ln>
+                          <a:solidFill>
+                            <a:prstClr val="black"/>
+                          </a:solidFill>
+                          <a:effectLst/>
+                          <a:uLnTx/>
+                          <a:uFillTx/>
+                          <a:latin typeface="Calibri" panose="020F0502020204030204"/>
+                          <a:ea typeface="+mn-ea"/>
+                          <a:cs typeface="+mn-cs"/>
+                        </a:rPr>
+                        <a:t>cell</a:t>
+                      </a:r>
+                      <a:endParaRPr lang="de-DE" sz="1400"/>
+                    </a:p>
+                  </a:txBody>
+                  <a:tcPr/>
+                </a:tc>
+                <a:tc>
+                  <a:txBody>
+                    <a:bodyPr/>
+                    <a:lstStyle/>
+                    <a:p>
+                      <a:pPr algn="ctr"/>
+                      <a:r>
+                        <a:rPr kumimoji="0" lang="de-DE" sz="1400" b="0" i="0" u="none" strike="noStrike" kern="1200" cap="none" spc="0" normalizeH="0" baseline="0" noProof="0" dirty="0" err="1">
+                          <a:ln>
+                            <a:noFill/>
+                          </a:ln>
+                          <a:solidFill>
+                            <a:prstClr val="black"/>
+                          </a:solidFill>
+                          <a:effectLst/>
+                          <a:uLnTx/>
+                          <a:uFillTx/>
+                          <a:latin typeface="Calibri" panose="020F0502020204030204"/>
+                          <a:ea typeface="+mn-ea"/>
+                          <a:cs typeface="+mn-cs"/>
+                        </a:rPr>
+                        <a:t>cell</a:t>
+                      </a:r>
+                      <a:endParaRPr lang="de-DE" sz="1400" dirty="0"/>
+                    </a:p>
+                  </a:txBody>
+                  <a:tcPr/>
+                </a:tc>
+                <a:extLst>
+                  <a:ext uri="{0D108BD9-81ED-4DB2-BD59-A6C34878D82A}">
+                    <a16:rowId xmlns:a16="http://schemas.microsoft.com/office/drawing/2014/main" val="625084061"/>
+                  </a:ext>
+                </a:extLst>
+              </a:tr>
+            </a:tbl>
+          </a:graphicData>
+        </a:graphic>
+      </p:graphicFrame>
     </p:spTree>
     <p:extLst>
       <p:ext uri="{BB962C8B-B14F-4D97-AF65-F5344CB8AC3E}">

</xml_diff>